<commit_message>
-- added plots for presentation  -- changed structure
</commit_message>
<xml_diff>
--- a/docs/dlw_conference_presentation.pptx
+++ b/docs/dlw_conference_presentation.pptx
@@ -5,7 +5,7 @@
     <p:sldMasterId id="2147483648" r:id="rId1"/>
   </p:sldMasterIdLst>
   <p:notesMasterIdLst>
-    <p:notesMasterId r:id="rId38"/>
+    <p:notesMasterId r:id="rId39"/>
   </p:notesMasterIdLst>
   <p:sldIdLst>
     <p:sldId id="256" r:id="rId2"/>
@@ -39,11 +39,12 @@
     <p:sldId id="778" r:id="rId30"/>
     <p:sldId id="770" r:id="rId31"/>
     <p:sldId id="780" r:id="rId32"/>
-    <p:sldId id="779" r:id="rId33"/>
-    <p:sldId id="798" r:id="rId34"/>
-    <p:sldId id="766" r:id="rId35"/>
-    <p:sldId id="270" r:id="rId36"/>
-    <p:sldId id="261" r:id="rId37"/>
+    <p:sldId id="801" r:id="rId33"/>
+    <p:sldId id="799" r:id="rId34"/>
+    <p:sldId id="798" r:id="rId35"/>
+    <p:sldId id="766" r:id="rId36"/>
+    <p:sldId id="270" r:id="rId37"/>
+    <p:sldId id="261" r:id="rId38"/>
   </p:sldIdLst>
   <p:sldSz cx="12192000" cy="6858000"/>
   <p:notesSz cx="6858000" cy="9144000"/>
@@ -235,7 +236,7 @@
           <a:p>
             <a:fld id="{0CEE2DC2-11C8-F949-BEF7-E8A2F77D8086}" type="datetimeFigureOut">
               <a:rPr lang="de-DE" smtClean="0"/>
-              <a:t>31.05.2020</a:t>
+              <a:t>04.06.2020</a:t>
             </a:fld>
             <a:endParaRPr lang="de-DE"/>
           </a:p>
@@ -3788,8 +3789,8 @@
           </a:p>
         </p:txBody>
       </p:sp>
-      <mc:AlternateContent xmlns:mc="http://schemas.openxmlformats.org/markup-compatibility/2006">
-        <mc:Choice xmlns:a14="http://schemas.microsoft.com/office/drawing/2010/main" Requires="a14">
+      <mc:AlternateContent xmlns:mc="http://schemas.openxmlformats.org/markup-compatibility/2006" xmlns:a14="http://schemas.microsoft.com/office/drawing/2010/main">
+        <mc:Choice Requires="a14">
           <p:sp>
             <p:nvSpPr>
               <p:cNvPr id="12" name="Textplatzhalter 2">
@@ -4937,7 +4938,7 @@
             </p:txBody>
           </p:sp>
         </mc:Choice>
-        <mc:Fallback>
+        <mc:Fallback xmlns="">
           <p:sp>
             <p:nvSpPr>
               <p:cNvPr id="12" name="Textplatzhalter 2">
@@ -31416,6 +31417,37 @@
           </a:p>
         </p:txBody>
       </p:sp>
+      <p:pic>
+        <p:nvPicPr>
+          <p:cNvPr id="3" name="Grafik 2">
+            <a:extLst>
+              <a:ext uri="{FF2B5EF4-FFF2-40B4-BE49-F238E27FC236}">
+                <a16:creationId xmlns:a16="http://schemas.microsoft.com/office/drawing/2014/main" id="{F163FCAB-15B5-4CAF-9EC6-A1DC61FEDC36}"/>
+              </a:ext>
+            </a:extLst>
+          </p:cNvPr>
+          <p:cNvPicPr>
+            <a:picLocks noChangeAspect="1"/>
+          </p:cNvPicPr>
+          <p:nvPr/>
+        </p:nvPicPr>
+        <p:blipFill>
+          <a:blip r:embed="rId2"/>
+          <a:stretch>
+            <a:fillRect/>
+          </a:stretch>
+        </p:blipFill>
+        <p:spPr>
+          <a:xfrm>
+            <a:off x="2229230" y="1825625"/>
+            <a:ext cx="7739597" cy="4295476"/>
+          </a:xfrm>
+          <a:prstGeom prst="rect">
+            <a:avLst/>
+          </a:prstGeom>
+          <a:noFill/>
+        </p:spPr>
+      </p:pic>
       <p:sp>
         <p:nvSpPr>
           <p:cNvPr id="4" name="Untertitel 3">
@@ -31451,130 +31483,10 @@
           </a:p>
         </p:txBody>
       </p:sp>
-      <p:pic>
-        <p:nvPicPr>
-          <p:cNvPr id="16" name="Grafik 15">
-            <a:extLst>
-              <a:ext uri="{FF2B5EF4-FFF2-40B4-BE49-F238E27FC236}">
-                <a16:creationId xmlns:a16="http://schemas.microsoft.com/office/drawing/2014/main" id="{D91C225E-D953-44F3-9788-48D5C3C6E93C}"/>
-              </a:ext>
-            </a:extLst>
-          </p:cNvPr>
-          <p:cNvPicPr>
-            <a:picLocks noChangeAspect="1"/>
-          </p:cNvPicPr>
-          <p:nvPr/>
-        </p:nvPicPr>
-        <p:blipFill>
-          <a:blip r:embed="rId2"/>
-          <a:stretch>
-            <a:fillRect/>
-          </a:stretch>
-        </p:blipFill>
-        <p:spPr>
-          <a:xfrm>
-            <a:off x="6297613" y="4257146"/>
-            <a:ext cx="4248479" cy="2243123"/>
-          </a:xfrm>
-          <a:prstGeom prst="rect">
-            <a:avLst/>
-          </a:prstGeom>
-        </p:spPr>
-      </p:pic>
-      <p:pic>
-        <p:nvPicPr>
-          <p:cNvPr id="17" name="Grafik 16">
-            <a:extLst>
-              <a:ext uri="{FF2B5EF4-FFF2-40B4-BE49-F238E27FC236}">
-                <a16:creationId xmlns:a16="http://schemas.microsoft.com/office/drawing/2014/main" id="{220AD482-378A-4247-B989-011A91EE0C2D}"/>
-              </a:ext>
-            </a:extLst>
-          </p:cNvPr>
-          <p:cNvPicPr>
-            <a:picLocks noChangeAspect="1"/>
-          </p:cNvPicPr>
-          <p:nvPr/>
-        </p:nvPicPr>
-        <p:blipFill>
-          <a:blip r:embed="rId3"/>
-          <a:stretch>
-            <a:fillRect/>
-          </a:stretch>
-        </p:blipFill>
-        <p:spPr>
-          <a:xfrm>
-            <a:off x="799771" y="4161181"/>
-            <a:ext cx="4611999" cy="2435055"/>
-          </a:xfrm>
-          <a:prstGeom prst="rect">
-            <a:avLst/>
-          </a:prstGeom>
-        </p:spPr>
-      </p:pic>
-      <p:pic>
-        <p:nvPicPr>
-          <p:cNvPr id="18" name="Grafik 17">
-            <a:extLst>
-              <a:ext uri="{FF2B5EF4-FFF2-40B4-BE49-F238E27FC236}">
-                <a16:creationId xmlns:a16="http://schemas.microsoft.com/office/drawing/2014/main" id="{2B20A3C4-7DD8-49F9-AA98-E09DAA35A539}"/>
-              </a:ext>
-            </a:extLst>
-          </p:cNvPr>
-          <p:cNvPicPr>
-            <a:picLocks noChangeAspect="1"/>
-          </p:cNvPicPr>
-          <p:nvPr/>
-        </p:nvPicPr>
-        <p:blipFill>
-          <a:blip r:embed="rId4"/>
-          <a:stretch>
-            <a:fillRect/>
-          </a:stretch>
-        </p:blipFill>
-        <p:spPr>
-          <a:xfrm>
-            <a:off x="799771" y="1779587"/>
-            <a:ext cx="4392613" cy="2359025"/>
-          </a:xfrm>
-          <a:prstGeom prst="rect">
-            <a:avLst/>
-          </a:prstGeom>
-        </p:spPr>
-      </p:pic>
-      <p:pic>
-        <p:nvPicPr>
-          <p:cNvPr id="19" name="Grafik 18">
-            <a:extLst>
-              <a:ext uri="{FF2B5EF4-FFF2-40B4-BE49-F238E27FC236}">
-                <a16:creationId xmlns:a16="http://schemas.microsoft.com/office/drawing/2014/main" id="{A5195800-9721-4A96-8FEF-65E1CB7B77CE}"/>
-              </a:ext>
-            </a:extLst>
-          </p:cNvPr>
-          <p:cNvPicPr>
-            <a:picLocks noChangeAspect="1"/>
-          </p:cNvPicPr>
-          <p:nvPr/>
-        </p:nvPicPr>
-        <p:blipFill>
-          <a:blip r:embed="rId5"/>
-          <a:stretch>
-            <a:fillRect/>
-          </a:stretch>
-        </p:blipFill>
-        <p:spPr>
-          <a:xfrm>
-            <a:off x="6297613" y="1670049"/>
-            <a:ext cx="4392613" cy="2359025"/>
-          </a:xfrm>
-          <a:prstGeom prst="rect">
-            <a:avLst/>
-          </a:prstGeom>
-        </p:spPr>
-      </p:pic>
     </p:spTree>
     <p:extLst>
       <p:ext uri="{BB962C8B-B14F-4D97-AF65-F5344CB8AC3E}">
-        <p14:creationId xmlns:p14="http://schemas.microsoft.com/office/powerpoint/2010/main" val="3822868935"/>
+        <p14:creationId xmlns:p14="http://schemas.microsoft.com/office/powerpoint/2010/main" val="3062189077"/>
       </p:ext>
     </p:extLst>
   </p:cSld>
@@ -31637,6 +31549,37 @@
           </a:p>
         </p:txBody>
       </p:sp>
+      <p:pic>
+        <p:nvPicPr>
+          <p:cNvPr id="5" name="Grafik 4" descr="Ein Bild, das Text, Karte enthält.&#10;&#10;Automatisch generierte Beschreibung">
+            <a:extLst>
+              <a:ext uri="{FF2B5EF4-FFF2-40B4-BE49-F238E27FC236}">
+                <a16:creationId xmlns:a16="http://schemas.microsoft.com/office/drawing/2014/main" id="{CC01D08E-03C2-44C7-A384-137D2BC8A2D8}"/>
+              </a:ext>
+            </a:extLst>
+          </p:cNvPr>
+          <p:cNvPicPr>
+            <a:picLocks noChangeAspect="1"/>
+          </p:cNvPicPr>
+          <p:nvPr/>
+        </p:nvPicPr>
+        <p:blipFill>
+          <a:blip r:embed="rId2"/>
+          <a:stretch>
+            <a:fillRect/>
+          </a:stretch>
+        </p:blipFill>
+        <p:spPr>
+          <a:xfrm>
+            <a:off x="2229230" y="1825625"/>
+            <a:ext cx="7739597" cy="4295476"/>
+          </a:xfrm>
+          <a:prstGeom prst="rect">
+            <a:avLst/>
+          </a:prstGeom>
+          <a:noFill/>
+        </p:spPr>
+      </p:pic>
       <p:sp>
         <p:nvSpPr>
           <p:cNvPr id="4" name="Untertitel 3">
@@ -31667,6 +31610,107 @@
           <a:p>
             <a:r>
               <a:rPr lang="en-US" dirty="0"/>
+              <a:t>3. Calculating stock risk for portfolio diversification</a:t>
+            </a:r>
+          </a:p>
+        </p:txBody>
+      </p:sp>
+    </p:spTree>
+    <p:extLst>
+      <p:ext uri="{BB962C8B-B14F-4D97-AF65-F5344CB8AC3E}">
+        <p14:creationId xmlns:p14="http://schemas.microsoft.com/office/powerpoint/2010/main" val="1686564060"/>
+      </p:ext>
+    </p:extLst>
+  </p:cSld>
+  <p:clrMapOvr>
+    <a:masterClrMapping/>
+  </p:clrMapOvr>
+</p:sld>
+</file>
+
+<file path=ppt/slides/slide34.xml><?xml version="1.0" encoding="utf-8"?>
+<p:sld xmlns:a="http://schemas.openxmlformats.org/drawingml/2006/main" xmlns:r="http://schemas.openxmlformats.org/officeDocument/2006/relationships" xmlns:p="http://schemas.openxmlformats.org/presentationml/2006/main">
+  <p:cSld>
+    <p:spTree>
+      <p:nvGrpSpPr>
+        <p:cNvPr id="1" name=""/>
+        <p:cNvGrpSpPr/>
+        <p:nvPr/>
+      </p:nvGrpSpPr>
+      <p:grpSpPr>
+        <a:xfrm>
+          <a:off x="0" y="0"/>
+          <a:ext cx="0" cy="0"/>
+          <a:chOff x="0" y="0"/>
+          <a:chExt cx="0" cy="0"/>
+        </a:xfrm>
+      </p:grpSpPr>
+      <p:sp>
+        <p:nvSpPr>
+          <p:cNvPr id="2" name="Titel 1">
+            <a:extLst>
+              <a:ext uri="{FF2B5EF4-FFF2-40B4-BE49-F238E27FC236}">
+                <a16:creationId xmlns:a16="http://schemas.microsoft.com/office/drawing/2014/main" id="{E802003F-882C-430F-822C-06CE78A36CD3}"/>
+              </a:ext>
+            </a:extLst>
+          </p:cNvPr>
+          <p:cNvSpPr>
+            <a:spLocks noGrp="1"/>
+          </p:cNvSpPr>
+          <p:nvPr>
+            <p:ph type="title"/>
+          </p:nvPr>
+        </p:nvSpPr>
+        <p:spPr>
+          <a:xfrm>
+            <a:off x="504497" y="408157"/>
+            <a:ext cx="11189065" cy="625423"/>
+          </a:xfrm>
+        </p:spPr>
+        <p:txBody>
+          <a:bodyPr anchor="t">
+            <a:normAutofit/>
+          </a:bodyPr>
+          <a:lstStyle/>
+          <a:p>
+            <a:r>
+              <a:rPr lang="de-DE" sz="3700" err="1"/>
+              <a:t>Results</a:t>
+            </a:r>
+            <a:endParaRPr lang="en-US" sz="3700"/>
+          </a:p>
+        </p:txBody>
+      </p:sp>
+      <p:sp>
+        <p:nvSpPr>
+          <p:cNvPr id="4" name="Untertitel 3">
+            <a:extLst>
+              <a:ext uri="{FF2B5EF4-FFF2-40B4-BE49-F238E27FC236}">
+                <a16:creationId xmlns:a16="http://schemas.microsoft.com/office/drawing/2014/main" id="{A53D6A67-34A1-4608-8251-AFD2F1ECDC10}"/>
+              </a:ext>
+            </a:extLst>
+          </p:cNvPr>
+          <p:cNvSpPr>
+            <a:spLocks noGrp="1"/>
+          </p:cNvSpPr>
+          <p:nvPr>
+            <p:ph type="subTitle" idx="13"/>
+          </p:nvPr>
+        </p:nvSpPr>
+        <p:spPr>
+          <a:xfrm>
+            <a:off x="504496" y="1148419"/>
+            <a:ext cx="11189065" cy="433271"/>
+          </a:xfrm>
+        </p:spPr>
+        <p:txBody>
+          <a:bodyPr>
+            <a:normAutofit/>
+          </a:bodyPr>
+          <a:lstStyle/>
+          <a:p>
+            <a:r>
+              <a:rPr lang="en-US" dirty="0"/>
               <a:t>4. Portfolio optimization using linear programming</a:t>
             </a:r>
           </a:p>
@@ -31685,7 +31729,7 @@
 </p:sld>
 </file>
 
-<file path=ppt/slides/slide34.xml><?xml version="1.0" encoding="utf-8"?>
+<file path=ppt/slides/slide35.xml><?xml version="1.0" encoding="utf-8"?>
 <p:sld xmlns:a="http://schemas.openxmlformats.org/drawingml/2006/main" xmlns:r="http://schemas.openxmlformats.org/officeDocument/2006/relationships" xmlns:p="http://schemas.openxmlformats.org/presentationml/2006/main">
   <p:cSld>
     <p:spTree>
@@ -31876,7 +31920,7 @@
 </p:sld>
 </file>
 
-<file path=ppt/slides/slide35.xml><?xml version="1.0" encoding="utf-8"?>
+<file path=ppt/slides/slide36.xml><?xml version="1.0" encoding="utf-8"?>
 <p:sld xmlns:a="http://schemas.openxmlformats.org/drawingml/2006/main" xmlns:r="http://schemas.openxmlformats.org/officeDocument/2006/relationships" xmlns:p="http://schemas.openxmlformats.org/presentationml/2006/main">
   <p:cSld>
     <p:spTree>
@@ -31974,7 +32018,7 @@
 </p:sld>
 </file>
 
-<file path=ppt/slides/slide36.xml><?xml version="1.0" encoding="utf-8"?>
+<file path=ppt/slides/slide37.xml><?xml version="1.0" encoding="utf-8"?>
 <p:sld xmlns:a="http://schemas.openxmlformats.org/drawingml/2006/main" xmlns:r="http://schemas.openxmlformats.org/officeDocument/2006/relationships" xmlns:p="http://schemas.openxmlformats.org/presentationml/2006/main" show="0">
   <p:cSld>
     <p:spTree>

</xml_diff>